<commit_message>
minor enhancements to docker slides
</commit_message>
<xml_diff>
--- a/00_why_docker_k8s.pptx
+++ b/00_why_docker_k8s.pptx
@@ -2655,7 +2655,7 @@
           <a:p>
             <a:r>
               <a:rPr lang="en-US" dirty="0"/>
-              <a:t>Well, Docker &amp; K8s are not “new” as such. The technology is around for quite some time. But it takes some until a technology is “enterprise ready” + Enterprise IT takes some time to pick up trends. With Docker &amp; K8s though, we’re somewhere doing quite well / are not that late.</a:t>
+              <a:t>Well, Docker &amp; K8s are not “new” as such. The technology is around for quite some time. But it takes some time until a technology is “enterprise ready” + Enterprise IT takes some time to pick up trends. With Docker &amp; K8s though, we’re somewhere doing quite well / are not that late.</a:t>
             </a:r>
           </a:p>
           <a:p>
@@ -37063,12 +37063,6 @@
 </file>
 
 <file path=customXml/item1.xml><?xml version="1.0" encoding="utf-8"?>
-<p:properties xmlns:p="http://schemas.microsoft.com/office/2006/metadata/properties" xmlns:xsi="http://www.w3.org/2001/XMLSchema-instance" xmlns:pc="http://schemas.microsoft.com/office/infopath/2007/PartnerControls">
-  <documentManagement/>
-</p:properties>
-</file>
-
-<file path=customXml/item2.xml><?xml version="1.0" encoding="utf-8"?>
 <ct:contentTypeSchema xmlns:ct="http://schemas.microsoft.com/office/2006/metadata/contentType" xmlns:ma="http://schemas.microsoft.com/office/2006/metadata/properties/metaAttributes" ct:_="" ma:_="" ma:contentTypeName="Document" ma:contentTypeID="0x01010048E40B1E99E8BE4AAC3A21245C12BD99" ma:contentTypeVersion="2" ma:contentTypeDescription="Create a new document." ma:contentTypeScope="" ma:versionID="4b0275ef11b5829381cec9e4729bc90e">
   <xsd:schema xmlns:xsd="http://www.w3.org/2001/XMLSchema" xmlns:xs="http://www.w3.org/2001/XMLSchema" xmlns:p="http://schemas.microsoft.com/office/2006/metadata/properties" xmlns:ns2="350ae53a-ba29-4ed5-89d3-487453a98c92" targetNamespace="http://schemas.microsoft.com/office/2006/metadata/properties" ma:root="true" ma:fieldsID="a5c72591f1964ae3fce3a31f55e0501c" ns2:_="">
     <xsd:import namespace="350ae53a-ba29-4ed5-89d3-487453a98c92"/>
@@ -37200,6 +37194,12 @@
 </ct:contentTypeSchema>
 </file>
 
+<file path=customXml/item2.xml><?xml version="1.0" encoding="utf-8"?>
+<p:properties xmlns:p="http://schemas.microsoft.com/office/2006/metadata/properties" xmlns:xsi="http://www.w3.org/2001/XMLSchema-instance" xmlns:pc="http://schemas.microsoft.com/office/infopath/2007/PartnerControls">
+  <documentManagement/>
+</p:properties>
+</file>
+
 <file path=customXml/item3.xml><?xml version="1.0" encoding="utf-8"?>
 <?mso-contentType ?>
 <FormTemplates xmlns="http://schemas.microsoft.com/sharepoint/v3/contenttype/forms">
@@ -37210,22 +37210,6 @@
 </file>
 
 <file path=customXml/itemProps1.xml><?xml version="1.0" encoding="utf-8"?>
-<ds:datastoreItem xmlns:ds="http://schemas.openxmlformats.org/officeDocument/2006/customXml" ds:itemID="{05AA34E2-B7AE-4E9D-91AF-F71B454E6E93}">
-  <ds:schemaRefs>
-    <ds:schemaRef ds:uri="http://schemas.openxmlformats.org/package/2006/metadata/core-properties"/>
-    <ds:schemaRef ds:uri="350ae53a-ba29-4ed5-89d3-487453a98c92"/>
-    <ds:schemaRef ds:uri="http://purl.org/dc/dcmitype/"/>
-    <ds:schemaRef ds:uri="http://schemas.microsoft.com/office/infopath/2007/PartnerControls"/>
-    <ds:schemaRef ds:uri="http://schemas.microsoft.com/office/2006/documentManagement/types"/>
-    <ds:schemaRef ds:uri="http://purl.org/dc/elements/1.1/"/>
-    <ds:schemaRef ds:uri="http://schemas.microsoft.com/office/2006/metadata/properties"/>
-    <ds:schemaRef ds:uri="http://purl.org/dc/terms/"/>
-    <ds:schemaRef ds:uri="http://www.w3.org/XML/1998/namespace"/>
-  </ds:schemaRefs>
-</ds:datastoreItem>
-</file>
-
-<file path=customXml/itemProps2.xml><?xml version="1.0" encoding="utf-8"?>
 <ds:datastoreItem xmlns:ds="http://schemas.openxmlformats.org/officeDocument/2006/customXml" ds:itemID="{368C8C32-C4FB-4000-9A59-30667DA280BE}">
   <ds:schemaRefs>
     <ds:schemaRef ds:uri="http://schemas.microsoft.com/office/2006/metadata/contentType"/>
@@ -37243,6 +37227,22 @@
 </ds:datastoreItem>
 </file>
 
+<file path=customXml/itemProps2.xml><?xml version="1.0" encoding="utf-8"?>
+<ds:datastoreItem xmlns:ds="http://schemas.openxmlformats.org/officeDocument/2006/customXml" ds:itemID="{05AA34E2-B7AE-4E9D-91AF-F71B454E6E93}">
+  <ds:schemaRefs>
+    <ds:schemaRef ds:uri="http://schemas.openxmlformats.org/package/2006/metadata/core-properties"/>
+    <ds:schemaRef ds:uri="350ae53a-ba29-4ed5-89d3-487453a98c92"/>
+    <ds:schemaRef ds:uri="http://purl.org/dc/dcmitype/"/>
+    <ds:schemaRef ds:uri="http://schemas.microsoft.com/office/infopath/2007/PartnerControls"/>
+    <ds:schemaRef ds:uri="http://schemas.microsoft.com/office/2006/documentManagement/types"/>
+    <ds:schemaRef ds:uri="http://purl.org/dc/elements/1.1/"/>
+    <ds:schemaRef ds:uri="http://schemas.microsoft.com/office/2006/metadata/properties"/>
+    <ds:schemaRef ds:uri="http://purl.org/dc/terms/"/>
+    <ds:schemaRef ds:uri="http://www.w3.org/XML/1998/namespace"/>
+  </ds:schemaRefs>
+</ds:datastoreItem>
+</file>
+
 <file path=customXml/itemProps3.xml><?xml version="1.0" encoding="utf-8"?>
 <ds:datastoreItem xmlns:ds="http://schemas.openxmlformats.org/officeDocument/2006/customXml" ds:itemID="{6E265ACB-EFA3-42C5-AD1B-CCDA0ED56330}">
   <ds:schemaRefs>

</xml_diff>